<commit_message>
revisi malam terakhir coi !
</commit_message>
<xml_diff>
--- a/Revisi/Perancangan dan Implementasi Sistem Pencarian Lowongan Internship Berbasis.pptx
+++ b/Revisi/Perancangan dan Implementasi Sistem Pencarian Lowongan Internship Berbasis.pptx
@@ -240,7 +240,7 @@
                   <a:schemeClr val="tx2"/>
                 </a:solidFill>
               </a:rPr>
-              <a:t>05-Feb-17</a:t>
+              <a:t>06-Feb-17</a:t>
             </a:fld>
             <a:endParaRPr>
               <a:solidFill>
@@ -430,7 +430,7 @@
             <a:fld id="{F95CF31C-F757-429C-A789-86504F04C3BE}" type="datetimeFigureOut">
               <a:rPr lang="en-US"/>
               <a:pPr/>
-              <a:t>05-Feb-17</a:t>
+              <a:t>06-Feb-17</a:t>
             </a:fld>
             <a:endParaRPr/>
           </a:p>
@@ -1210,7 +1210,7 @@
           <a:p>
             <a:fld id="{7AECB6C2-1084-4AED-A74A-DF028B0094EA}" type="datetimeFigureOut">
               <a:rPr lang="en-US"/>
-              <a:t>05-Feb-17</a:t>
+              <a:t>06-Feb-17</a:t>
             </a:fld>
             <a:endParaRPr/>
           </a:p>
@@ -1402,7 +1402,7 @@
           <a:p>
             <a:fld id="{7AECB6C2-1084-4AED-A74A-DF028B0094EA}" type="datetimeFigureOut">
               <a:rPr lang="en-US"/>
-              <a:t>05-Feb-17</a:t>
+              <a:t>06-Feb-17</a:t>
             </a:fld>
             <a:endParaRPr/>
           </a:p>
@@ -1600,7 +1600,7 @@
           <a:p>
             <a:fld id="{8B5A30F4-0B4E-4E4B-BC36-C30CD13F4E17}" type="datetimeFigureOut">
               <a:rPr lang="en-US"/>
-              <a:t>05-Feb-17</a:t>
+              <a:t>06-Feb-17</a:t>
             </a:fld>
             <a:endParaRPr dirty="0"/>
           </a:p>
@@ -2117,7 +2117,7 @@
           <a:p>
             <a:fld id="{2DD204D1-F9BD-4643-8480-6EA41EB484F1}" type="datetimeFigureOut">
               <a:rPr lang="en-US"/>
-              <a:t>05-Feb-17</a:t>
+              <a:t>06-Feb-17</a:t>
             </a:fld>
             <a:endParaRPr/>
           </a:p>
@@ -2565,7 +2565,7 @@
           <a:p>
             <a:fld id="{2DD204D1-F9BD-4643-8480-6EA41EB484F1}" type="datetimeFigureOut">
               <a:rPr lang="en-US"/>
-              <a:t>05-Feb-17</a:t>
+              <a:t>06-Feb-17</a:t>
             </a:fld>
             <a:endParaRPr/>
           </a:p>
@@ -2695,7 +2695,7 @@
           <a:p>
             <a:fld id="{2DD204D1-F9BD-4643-8480-6EA41EB484F1}" type="datetimeFigureOut">
               <a:rPr lang="en-US"/>
-              <a:t>05-Feb-17</a:t>
+              <a:t>06-Feb-17</a:t>
             </a:fld>
             <a:endParaRPr/>
           </a:p>
@@ -2802,7 +2802,7 @@
           <a:p>
             <a:fld id="{2DD204D1-F9BD-4643-8480-6EA41EB484F1}" type="datetimeFigureOut">
               <a:rPr lang="en-US"/>
-              <a:t>05-Feb-17</a:t>
+              <a:t>06-Feb-17</a:t>
             </a:fld>
             <a:endParaRPr/>
           </a:p>
@@ -3159,7 +3159,7 @@
           <a:p>
             <a:fld id="{126BF754-515F-40B9-8D24-D54D5825B3D0}" type="datetimeFigureOut">
               <a:rPr lang="en-US"/>
-              <a:t>05-Feb-17</a:t>
+              <a:t>06-Feb-17</a:t>
             </a:fld>
             <a:endParaRPr/>
           </a:p>
@@ -3496,7 +3496,7 @@
           <a:p>
             <a:fld id="{126BF754-515F-40B9-8D24-D54D5825B3D0}" type="datetimeFigureOut">
               <a:rPr lang="en-US"/>
-              <a:t>05-Feb-17</a:t>
+              <a:t>06-Feb-17</a:t>
             </a:fld>
             <a:endParaRPr/>
           </a:p>
@@ -3791,7 +3791,7 @@
             <a:fld id="{2DD204D1-F9BD-4643-8480-6EA41EB484F1}" type="datetimeFigureOut">
               <a:rPr lang="en-US" smtClean="0"/>
               <a:pPr/>
-              <a:t>05-Feb-17</a:t>
+              <a:t>06-Feb-17</a:t>
             </a:fld>
             <a:endParaRPr lang="en-US"/>
           </a:p>
@@ -5787,6 +5787,416 @@
           </a:prstGeom>
         </p:spPr>
       </p:pic>
+      <p:sp>
+        <p:nvSpPr>
+          <p:cNvPr id="2" name="Left Brace 1"/>
+          <p:cNvSpPr/>
+          <p:nvPr/>
+        </p:nvSpPr>
+        <p:spPr>
+          <a:xfrm>
+            <a:off x="3810000" y="762000"/>
+            <a:ext cx="304800" cy="1524000"/>
+          </a:xfrm>
+          <a:prstGeom prst="leftBrace">
+            <a:avLst/>
+          </a:prstGeom>
+        </p:spPr>
+        <p:style>
+          <a:lnRef idx="1">
+            <a:schemeClr val="accent1"/>
+          </a:lnRef>
+          <a:fillRef idx="0">
+            <a:schemeClr val="accent1"/>
+          </a:fillRef>
+          <a:effectRef idx="0">
+            <a:schemeClr val="accent1"/>
+          </a:effectRef>
+          <a:fontRef idx="minor">
+            <a:schemeClr val="tx1"/>
+          </a:fontRef>
+        </p:style>
+        <p:txBody>
+          <a:bodyPr rtlCol="0" anchor="ctr"/>
+          <a:lstStyle/>
+          <a:p>
+            <a:pPr algn="ctr"/>
+            <a:endParaRPr lang="en-US"/>
+          </a:p>
+        </p:txBody>
+      </p:sp>
+      <p:sp>
+        <p:nvSpPr>
+          <p:cNvPr id="6" name="Left Brace 5"/>
+          <p:cNvSpPr/>
+          <p:nvPr/>
+        </p:nvSpPr>
+        <p:spPr>
+          <a:xfrm>
+            <a:off x="3838575" y="2912552"/>
+            <a:ext cx="304800" cy="668848"/>
+          </a:xfrm>
+          <a:prstGeom prst="leftBrace">
+            <a:avLst/>
+          </a:prstGeom>
+        </p:spPr>
+        <p:style>
+          <a:lnRef idx="1">
+            <a:schemeClr val="accent1"/>
+          </a:lnRef>
+          <a:fillRef idx="0">
+            <a:schemeClr val="accent1"/>
+          </a:fillRef>
+          <a:effectRef idx="0">
+            <a:schemeClr val="accent1"/>
+          </a:effectRef>
+          <a:fontRef idx="minor">
+            <a:schemeClr val="tx1"/>
+          </a:fontRef>
+        </p:style>
+        <p:txBody>
+          <a:bodyPr rtlCol="0" anchor="ctr"/>
+          <a:lstStyle/>
+          <a:p>
+            <a:pPr algn="ctr"/>
+            <a:endParaRPr lang="en-US"/>
+          </a:p>
+        </p:txBody>
+      </p:sp>
+      <p:sp>
+        <p:nvSpPr>
+          <p:cNvPr id="13" name="Arrow: Right 12"/>
+          <p:cNvSpPr/>
+          <p:nvPr/>
+        </p:nvSpPr>
+        <p:spPr>
+          <a:xfrm>
+            <a:off x="3733800" y="4114800"/>
+            <a:ext cx="381000" cy="152400"/>
+          </a:xfrm>
+          <a:prstGeom prst="rightArrow">
+            <a:avLst/>
+          </a:prstGeom>
+        </p:spPr>
+        <p:style>
+          <a:lnRef idx="2">
+            <a:schemeClr val="accent1">
+              <a:shade val="50000"/>
+            </a:schemeClr>
+          </a:lnRef>
+          <a:fillRef idx="1">
+            <a:schemeClr val="accent1"/>
+          </a:fillRef>
+          <a:effectRef idx="0">
+            <a:schemeClr val="accent1"/>
+          </a:effectRef>
+          <a:fontRef idx="minor">
+            <a:schemeClr val="lt1"/>
+          </a:fontRef>
+        </p:style>
+        <p:txBody>
+          <a:bodyPr rtlCol="0" anchor="ctr"/>
+          <a:lstStyle/>
+          <a:p>
+            <a:pPr algn="ctr"/>
+            <a:endParaRPr lang="en-US"/>
+          </a:p>
+        </p:txBody>
+      </p:sp>
+      <p:sp>
+        <p:nvSpPr>
+          <p:cNvPr id="14" name="Arrow: Right 13"/>
+          <p:cNvSpPr/>
+          <p:nvPr/>
+        </p:nvSpPr>
+        <p:spPr>
+          <a:xfrm>
+            <a:off x="3733800" y="4724400"/>
+            <a:ext cx="381000" cy="152400"/>
+          </a:xfrm>
+          <a:prstGeom prst="rightArrow">
+            <a:avLst/>
+          </a:prstGeom>
+        </p:spPr>
+        <p:style>
+          <a:lnRef idx="2">
+            <a:schemeClr val="accent1">
+              <a:shade val="50000"/>
+            </a:schemeClr>
+          </a:lnRef>
+          <a:fillRef idx="1">
+            <a:schemeClr val="accent1"/>
+          </a:fillRef>
+          <a:effectRef idx="0">
+            <a:schemeClr val="accent1"/>
+          </a:effectRef>
+          <a:fontRef idx="minor">
+            <a:schemeClr val="lt1"/>
+          </a:fontRef>
+        </p:style>
+        <p:txBody>
+          <a:bodyPr rtlCol="0" anchor="ctr"/>
+          <a:lstStyle/>
+          <a:p>
+            <a:pPr algn="ctr"/>
+            <a:endParaRPr lang="en-US"/>
+          </a:p>
+        </p:txBody>
+      </p:sp>
+      <p:sp>
+        <p:nvSpPr>
+          <p:cNvPr id="15" name="Arrow: Right 14"/>
+          <p:cNvSpPr/>
+          <p:nvPr/>
+        </p:nvSpPr>
+        <p:spPr>
+          <a:xfrm rot="10800000">
+            <a:off x="7467600" y="6096000"/>
+            <a:ext cx="381000" cy="152400"/>
+          </a:xfrm>
+          <a:prstGeom prst="rightArrow">
+            <a:avLst/>
+          </a:prstGeom>
+        </p:spPr>
+        <p:style>
+          <a:lnRef idx="2">
+            <a:schemeClr val="accent1">
+              <a:shade val="50000"/>
+            </a:schemeClr>
+          </a:lnRef>
+          <a:fillRef idx="1">
+            <a:schemeClr val="accent1"/>
+          </a:fillRef>
+          <a:effectRef idx="0">
+            <a:schemeClr val="accent1"/>
+          </a:effectRef>
+          <a:fontRef idx="minor">
+            <a:schemeClr val="lt1"/>
+          </a:fontRef>
+        </p:style>
+        <p:txBody>
+          <a:bodyPr rtlCol="0" anchor="ctr"/>
+          <a:lstStyle/>
+          <a:p>
+            <a:pPr algn="ctr"/>
+            <a:endParaRPr lang="en-US"/>
+          </a:p>
+        </p:txBody>
+      </p:sp>
+      <p:sp>
+        <p:nvSpPr>
+          <p:cNvPr id="16" name="TextBox 15"/>
+          <p:cNvSpPr txBox="1"/>
+          <p:nvPr/>
+        </p:nvSpPr>
+        <p:spPr>
+          <a:xfrm>
+            <a:off x="3276600" y="1219200"/>
+            <a:ext cx="457200" cy="461665"/>
+          </a:xfrm>
+          <a:prstGeom prst="rect">
+            <a:avLst/>
+          </a:prstGeom>
+          <a:noFill/>
+        </p:spPr>
+        <p:txBody>
+          <a:bodyPr wrap="square" rtlCol="0">
+            <a:spAutoFit/>
+          </a:bodyPr>
+          <a:lstStyle/>
+          <a:p>
+            <a:r>
+              <a:rPr lang="en-US" dirty="0"/>
+              <a:t>1</a:t>
+            </a:r>
+          </a:p>
+        </p:txBody>
+      </p:sp>
+      <p:sp>
+        <p:nvSpPr>
+          <p:cNvPr id="17" name="TextBox 16"/>
+          <p:cNvSpPr txBox="1"/>
+          <p:nvPr/>
+        </p:nvSpPr>
+        <p:spPr>
+          <a:xfrm>
+            <a:off x="3381375" y="3016143"/>
+            <a:ext cx="457200" cy="461665"/>
+          </a:xfrm>
+          <a:prstGeom prst="rect">
+            <a:avLst/>
+          </a:prstGeom>
+          <a:noFill/>
+        </p:spPr>
+        <p:txBody>
+          <a:bodyPr wrap="square" rtlCol="0">
+            <a:spAutoFit/>
+          </a:bodyPr>
+          <a:lstStyle/>
+          <a:p>
+            <a:r>
+              <a:rPr lang="en-US" dirty="0"/>
+              <a:t>2</a:t>
+            </a:r>
+          </a:p>
+        </p:txBody>
+      </p:sp>
+      <p:sp>
+        <p:nvSpPr>
+          <p:cNvPr id="18" name="TextBox 17"/>
+          <p:cNvSpPr txBox="1"/>
+          <p:nvPr/>
+        </p:nvSpPr>
+        <p:spPr>
+          <a:xfrm>
+            <a:off x="3352800" y="3942301"/>
+            <a:ext cx="457200" cy="461665"/>
+          </a:xfrm>
+          <a:prstGeom prst="rect">
+            <a:avLst/>
+          </a:prstGeom>
+          <a:noFill/>
+        </p:spPr>
+        <p:txBody>
+          <a:bodyPr wrap="square" rtlCol="0">
+            <a:spAutoFit/>
+          </a:bodyPr>
+          <a:lstStyle/>
+          <a:p>
+            <a:r>
+              <a:rPr lang="en-US" dirty="0"/>
+              <a:t>3</a:t>
+            </a:r>
+          </a:p>
+        </p:txBody>
+      </p:sp>
+      <p:sp>
+        <p:nvSpPr>
+          <p:cNvPr id="19" name="TextBox 18"/>
+          <p:cNvSpPr txBox="1"/>
+          <p:nvPr/>
+        </p:nvSpPr>
+        <p:spPr>
+          <a:xfrm>
+            <a:off x="3352800" y="4583304"/>
+            <a:ext cx="457200" cy="461665"/>
+          </a:xfrm>
+          <a:prstGeom prst="rect">
+            <a:avLst/>
+          </a:prstGeom>
+          <a:noFill/>
+        </p:spPr>
+        <p:txBody>
+          <a:bodyPr wrap="square" rtlCol="0">
+            <a:spAutoFit/>
+          </a:bodyPr>
+          <a:lstStyle/>
+          <a:p>
+            <a:r>
+              <a:rPr lang="en-US" dirty="0"/>
+              <a:t>4</a:t>
+            </a:r>
+          </a:p>
+        </p:txBody>
+      </p:sp>
+      <p:sp>
+        <p:nvSpPr>
+          <p:cNvPr id="20" name="TextBox 19"/>
+          <p:cNvSpPr txBox="1"/>
+          <p:nvPr/>
+        </p:nvSpPr>
+        <p:spPr>
+          <a:xfrm>
+            <a:off x="7858125" y="5941367"/>
+            <a:ext cx="457200" cy="461665"/>
+          </a:xfrm>
+          <a:prstGeom prst="rect">
+            <a:avLst/>
+          </a:prstGeom>
+          <a:noFill/>
+        </p:spPr>
+        <p:txBody>
+          <a:bodyPr wrap="square" rtlCol="0">
+            <a:spAutoFit/>
+          </a:bodyPr>
+          <a:lstStyle/>
+          <a:p>
+            <a:r>
+              <a:rPr lang="en-US" dirty="0"/>
+              <a:t>4</a:t>
+            </a:r>
+          </a:p>
+        </p:txBody>
+      </p:sp>
+      <p:sp>
+        <p:nvSpPr>
+          <p:cNvPr id="21" name="Arrow: Right 20"/>
+          <p:cNvSpPr/>
+          <p:nvPr/>
+        </p:nvSpPr>
+        <p:spPr>
+          <a:xfrm>
+            <a:off x="3786188" y="6103747"/>
+            <a:ext cx="381000" cy="152400"/>
+          </a:xfrm>
+          <a:prstGeom prst="rightArrow">
+            <a:avLst/>
+          </a:prstGeom>
+        </p:spPr>
+        <p:style>
+          <a:lnRef idx="2">
+            <a:schemeClr val="accent1">
+              <a:shade val="50000"/>
+            </a:schemeClr>
+          </a:lnRef>
+          <a:fillRef idx="1">
+            <a:schemeClr val="accent1"/>
+          </a:fillRef>
+          <a:effectRef idx="0">
+            <a:schemeClr val="accent1"/>
+          </a:effectRef>
+          <a:fontRef idx="minor">
+            <a:schemeClr val="lt1"/>
+          </a:fontRef>
+        </p:style>
+        <p:txBody>
+          <a:bodyPr rtlCol="0" anchor="ctr"/>
+          <a:lstStyle/>
+          <a:p>
+            <a:pPr algn="ctr"/>
+            <a:endParaRPr lang="en-US"/>
+          </a:p>
+        </p:txBody>
+      </p:sp>
+      <p:sp>
+        <p:nvSpPr>
+          <p:cNvPr id="22" name="TextBox 21"/>
+          <p:cNvSpPr txBox="1"/>
+          <p:nvPr/>
+        </p:nvSpPr>
+        <p:spPr>
+          <a:xfrm>
+            <a:off x="3420446" y="5949114"/>
+            <a:ext cx="457200" cy="461665"/>
+          </a:xfrm>
+          <a:prstGeom prst="rect">
+            <a:avLst/>
+          </a:prstGeom>
+          <a:noFill/>
+        </p:spPr>
+        <p:txBody>
+          <a:bodyPr wrap="square" rtlCol="0">
+            <a:spAutoFit/>
+          </a:bodyPr>
+          <a:lstStyle/>
+          <a:p>
+            <a:r>
+              <a:rPr lang="en-US" dirty="0"/>
+              <a:t>5</a:t>
+            </a:r>
+          </a:p>
+        </p:txBody>
+      </p:sp>
     </p:spTree>
     <p:extLst>
       <p:ext uri="{BB962C8B-B14F-4D97-AF65-F5344CB8AC3E}">
@@ -8608,6 +9018,15 @@
 </file>
 
 <file path=customXml/item2.xml><?xml version="1.0" encoding="utf-8"?>
+<?mso-contentType ?>
+<FormTemplates xmlns="http://schemas.microsoft.com/sharepoint/v3/contenttype/forms">
+  <Display>DocumentLibraryForm</Display>
+  <Edit>AssetEditForm</Edit>
+  <New>DocumentLibraryForm</New>
+</FormTemplates>
+</file>
+
+<file path=customXml/item3.xml><?xml version="1.0" encoding="utf-8"?>
 <p:properties xmlns:p="http://schemas.microsoft.com/office/2006/metadata/properties" xmlns:xsi="http://www.w3.org/2001/XMLSchema-instance" xmlns:pc="http://schemas.microsoft.com/office/infopath/2007/PartnerControls">
   <documentManagement>
     <LocPublishedLinkedAssetsLookup xmlns="4873beb7-5857-4685-be1f-d57550cc96cc" xsi:nil="true"/>
@@ -8743,15 +9162,6 @@
 </p:properties>
 </file>
 
-<file path=customXml/item3.xml><?xml version="1.0" encoding="utf-8"?>
-<?mso-contentType ?>
-<FormTemplates xmlns="http://schemas.microsoft.com/sharepoint/v3/contenttype/forms">
-  <Display>DocumentLibraryForm</Display>
-  <Edit>AssetEditForm</Edit>
-  <New>DocumentLibraryForm</New>
-</FormTemplates>
-</file>
-
 <file path=customXml/itemProps1.xml><?xml version="1.0" encoding="utf-8"?>
 <ds:datastoreItem xmlns:ds="http://schemas.openxmlformats.org/officeDocument/2006/customXml" ds:itemID="{BBB5C329-08A6-4E5E-AEF1-A97828C87411}">
   <ds:schemaRefs>
@@ -8771,6 +9181,14 @@
 </file>
 
 <file path=customXml/itemProps2.xml><?xml version="1.0" encoding="utf-8"?>
+<ds:datastoreItem xmlns:ds="http://schemas.openxmlformats.org/officeDocument/2006/customXml" ds:itemID="{E1B558C7-619B-49BE-9097-7FCBDADD4ECE}">
+  <ds:schemaRefs>
+    <ds:schemaRef ds:uri="http://schemas.microsoft.com/sharepoint/v3/contenttype/forms"/>
+  </ds:schemaRefs>
+</ds:datastoreItem>
+</file>
+
+<file path=customXml/itemProps3.xml><?xml version="1.0" encoding="utf-8"?>
 <ds:datastoreItem xmlns:ds="http://schemas.openxmlformats.org/officeDocument/2006/customXml" ds:itemID="{F301D382-32B0-43EE-932C-28906AF37617}">
   <ds:schemaRefs>
     <ds:schemaRef ds:uri="4873beb7-5857-4685-be1f-d57550cc96cc"/>
@@ -8784,12 +9202,4 @@
     <ds:schemaRef ds:uri="http://schemas.microsoft.com/office/2006/metadata/properties"/>
   </ds:schemaRefs>
 </ds:datastoreItem>
-</file>
-
-<file path=customXml/itemProps3.xml><?xml version="1.0" encoding="utf-8"?>
-<ds:datastoreItem xmlns:ds="http://schemas.openxmlformats.org/officeDocument/2006/customXml" ds:itemID="{E1B558C7-619B-49BE-9097-7FCBDADD4ECE}">
-  <ds:schemaRefs>
-    <ds:schemaRef ds:uri="http://schemas.microsoft.com/sharepoint/v3/contenttype/forms"/>
-  </ds:schemaRefs>
-</ds:datastoreItem>
 </file>
</xml_diff>